<commit_message>
Updated lab name in PPT
</commit_message>
<xml_diff>
--- a/沈自所简约主题4-3 小字版.pptx
+++ b/沈自所简约主题4-3 小字版.pptx
@@ -230,7 +230,7 @@
           <a:p>
             <a:fld id="{D0FF6841-5A30-4BA2-9AA8-091D97DEB8EE}" type="datetimeFigureOut">
               <a:rPr lang="zh-CN" altLang="en-US" smtClean="0"/>
-              <a:t>2025/2/17</a:t>
+              <a:t>2025/9/3</a:t>
             </a:fld>
             <a:endParaRPr lang="zh-CN" altLang="en-US"/>
           </a:p>
@@ -423,7 +423,7 @@
           <a:p>
             <a:fld id="{64CCC035-8AFA-489C-B6CB-8B10F01B783C}" type="datetimeFigureOut">
               <a:rPr lang="zh-CN" altLang="en-US" smtClean="0"/>
-              <a:t>2025/2/17</a:t>
+              <a:t>2025/9/3</a:t>
             </a:fld>
             <a:endParaRPr lang="zh-CN" altLang="en-US"/>
           </a:p>
@@ -995,7 +995,7 @@
           <a:p>
             <a:fld id="{675E4DE0-7905-474C-A68F-6F1A2B2F2356}" type="datetime1">
               <a:rPr lang="zh-CN" altLang="en-US" smtClean="0"/>
-              <a:t>2025/2/17</a:t>
+              <a:t>2025/9/3</a:t>
             </a:fld>
             <a:endParaRPr lang="zh-CN" altLang="en-US" dirty="0"/>
           </a:p>
@@ -1032,30 +1032,17 @@
             <a:lvl1pPr algn="r">
               <a:defRPr sz="1200" b="1">
                 <a:solidFill>
-                  <a:schemeClr val="tx1">
-                    <a:tint val="82000"/>
-                  </a:schemeClr>
+                  <a:schemeClr val="accent6"/>
                 </a:solidFill>
               </a:defRPr>
             </a:lvl1pPr>
           </a:lstStyle>
           <a:p>
-            <a:pPr>
-              <a:defRPr/>
-            </a:pPr>
-            <a:r>
-              <a:rPr lang="zh-CN" altLang="en-US">
-                <a:solidFill>
-                  <a:srgbClr val="969FA7"/>
-                </a:solidFill>
-              </a:rPr>
-              <a:t>机器人学国家重点实验室</a:t>
-            </a:r>
-            <a:endParaRPr lang="zh-CN" altLang="en-US" dirty="0">
-              <a:solidFill>
-                <a:srgbClr val="969FA7"/>
-              </a:solidFill>
-            </a:endParaRPr>
+            <a:r>
+              <a:rPr lang="zh-CN" altLang="en-US" dirty="0"/>
+              <a:t>机器人与智能系统全国重点实验室</a:t>
+            </a:r>
+            <a:endParaRPr lang="en-US" altLang="zh-CN" dirty="0"/>
           </a:p>
         </p:txBody>
       </p:sp>
@@ -1193,7 +1180,7 @@
           <a:p>
             <a:fld id="{75841F7E-7EDE-4345-82F1-868AA4A653AE}" type="datetime1">
               <a:rPr lang="zh-CN" altLang="en-US" smtClean="0"/>
-              <a:t>2025/2/17</a:t>
+              <a:t>2025/9/3</a:t>
             </a:fld>
             <a:endParaRPr lang="zh-CN" altLang="en-US" dirty="0"/>
           </a:p>
@@ -1218,24 +1205,21 @@
         <p:spPr/>
         <p:txBody>
           <a:bodyPr/>
-          <a:lstStyle/>
-          <a:p>
-            <a:pPr>
-              <a:defRPr/>
-            </a:pPr>
-            <a:r>
-              <a:rPr lang="zh-CN" altLang="en-US">
-                <a:solidFill>
-                  <a:srgbClr val="969FA7"/>
-                </a:solidFill>
-              </a:rPr>
-              <a:t>机器人学国家重点实验室</a:t>
-            </a:r>
-            <a:endParaRPr lang="zh-CN" altLang="en-US" dirty="0">
-              <a:solidFill>
-                <a:srgbClr val="969FA7"/>
-              </a:solidFill>
-            </a:endParaRPr>
+          <a:lstStyle>
+            <a:lvl1pPr>
+              <a:defRPr>
+                <a:solidFill>
+                  <a:schemeClr val="accent6"/>
+                </a:solidFill>
+              </a:defRPr>
+            </a:lvl1pPr>
+          </a:lstStyle>
+          <a:p>
+            <a:r>
+              <a:rPr lang="zh-CN" altLang="en-US" dirty="0"/>
+              <a:t>机器人与智能系统全国重点实验室</a:t>
+            </a:r>
+            <a:endParaRPr lang="en-US" altLang="zh-CN" dirty="0"/>
           </a:p>
         </p:txBody>
       </p:sp>
@@ -1513,7 +1497,7 @@
           <a:p>
             <a:fld id="{DCBC8674-F64C-41C2-8CED-1125BA2FBE38}" type="datetime1">
               <a:rPr lang="zh-CN" altLang="en-US" smtClean="0"/>
-              <a:t>2025/2/17</a:t>
+              <a:t>2025/9/3</a:t>
             </a:fld>
             <a:endParaRPr lang="zh-CN" altLang="en-US" dirty="0"/>
           </a:p>
@@ -1538,24 +1522,21 @@
         <p:spPr/>
         <p:txBody>
           <a:bodyPr/>
-          <a:lstStyle/>
-          <a:p>
-            <a:pPr>
-              <a:defRPr/>
-            </a:pPr>
-            <a:r>
-              <a:rPr lang="zh-CN" altLang="en-US">
-                <a:solidFill>
-                  <a:srgbClr val="969FA7"/>
-                </a:solidFill>
-              </a:rPr>
-              <a:t>机器人学国家重点实验室</a:t>
-            </a:r>
-            <a:endParaRPr lang="zh-CN" altLang="en-US" dirty="0">
-              <a:solidFill>
-                <a:srgbClr val="969FA7"/>
-              </a:solidFill>
-            </a:endParaRPr>
+          <a:lstStyle>
+            <a:lvl1pPr>
+              <a:defRPr>
+                <a:solidFill>
+                  <a:schemeClr val="accent6"/>
+                </a:solidFill>
+              </a:defRPr>
+            </a:lvl1pPr>
+          </a:lstStyle>
+          <a:p>
+            <a:r>
+              <a:rPr lang="zh-CN" altLang="en-US" dirty="0"/>
+              <a:t>机器人与智能系统全国重点实验室</a:t>
+            </a:r>
+            <a:endParaRPr lang="en-US" altLang="zh-CN" dirty="0"/>
           </a:p>
         </p:txBody>
       </p:sp>
@@ -1825,7 +1806,7 @@
           <a:p>
             <a:fld id="{632AE471-E089-404A-818D-A2CE28C7DBC8}" type="datetime1">
               <a:rPr lang="zh-CN" altLang="en-US" smtClean="0"/>
-              <a:t>2025/2/17</a:t>
+              <a:t>2025/9/3</a:t>
             </a:fld>
             <a:endParaRPr lang="zh-CN" altLang="en-US" dirty="0"/>
           </a:p>
@@ -1850,24 +1831,21 @@
         <p:spPr/>
         <p:txBody>
           <a:bodyPr/>
-          <a:lstStyle/>
-          <a:p>
-            <a:pPr>
-              <a:defRPr/>
-            </a:pPr>
-            <a:r>
-              <a:rPr lang="zh-CN" altLang="en-US">
-                <a:solidFill>
-                  <a:srgbClr val="969FA7"/>
-                </a:solidFill>
-              </a:rPr>
-              <a:t>机器人学国家重点实验室</a:t>
-            </a:r>
-            <a:endParaRPr lang="zh-CN" altLang="en-US" dirty="0">
-              <a:solidFill>
-                <a:srgbClr val="969FA7"/>
-              </a:solidFill>
-            </a:endParaRPr>
+          <a:lstStyle>
+            <a:lvl1pPr>
+              <a:defRPr>
+                <a:solidFill>
+                  <a:schemeClr val="accent6"/>
+                </a:solidFill>
+              </a:defRPr>
+            </a:lvl1pPr>
+          </a:lstStyle>
+          <a:p>
+            <a:r>
+              <a:rPr lang="zh-CN" altLang="en-US" dirty="0"/>
+              <a:t>机器人与智能系统全国重点实验室</a:t>
+            </a:r>
+            <a:endParaRPr lang="en-US" altLang="zh-CN" dirty="0"/>
           </a:p>
         </p:txBody>
       </p:sp>
@@ -2070,7 +2048,7 @@
           <a:p>
             <a:fld id="{49D16AC6-5A2D-4FEB-9AE5-A36ABC9E06DB}" type="datetime1">
               <a:rPr lang="zh-CN" altLang="en-US" smtClean="0"/>
-              <a:t>2025/2/17</a:t>
+              <a:t>2025/9/3</a:t>
             </a:fld>
             <a:endParaRPr lang="zh-CN" altLang="en-US" dirty="0"/>
           </a:p>
@@ -2095,24 +2073,21 @@
         <p:spPr/>
         <p:txBody>
           <a:bodyPr/>
-          <a:lstStyle/>
-          <a:p>
-            <a:pPr>
-              <a:defRPr/>
-            </a:pPr>
-            <a:r>
-              <a:rPr lang="zh-CN" altLang="en-US">
-                <a:solidFill>
-                  <a:srgbClr val="969FA7"/>
-                </a:solidFill>
-              </a:rPr>
-              <a:t>机器人学国家重点实验室</a:t>
-            </a:r>
-            <a:endParaRPr lang="zh-CN" altLang="en-US" dirty="0">
-              <a:solidFill>
-                <a:srgbClr val="969FA7"/>
-              </a:solidFill>
-            </a:endParaRPr>
+          <a:lstStyle>
+            <a:lvl1pPr>
+              <a:defRPr>
+                <a:solidFill>
+                  <a:schemeClr val="accent6"/>
+                </a:solidFill>
+              </a:defRPr>
+            </a:lvl1pPr>
+          </a:lstStyle>
+          <a:p>
+            <a:r>
+              <a:rPr lang="zh-CN" altLang="en-US" dirty="0"/>
+              <a:t>机器人与智能系统全国重点实验室</a:t>
+            </a:r>
+            <a:endParaRPr lang="en-US" altLang="zh-CN" dirty="0"/>
           </a:p>
         </p:txBody>
       </p:sp>
@@ -2290,7 +2265,7 @@
           <a:p>
             <a:fld id="{FB42BE52-AAA4-42A5-8437-AC76014B3A0B}" type="datetime1">
               <a:rPr lang="zh-CN" altLang="en-US" smtClean="0"/>
-              <a:t>2025/2/17</a:t>
+              <a:t>2025/9/3</a:t>
             </a:fld>
             <a:endParaRPr lang="zh-CN" altLang="en-US" dirty="0"/>
           </a:p>
@@ -2315,24 +2290,21 @@
         <p:spPr/>
         <p:txBody>
           <a:bodyPr/>
-          <a:lstStyle/>
-          <a:p>
-            <a:pPr>
-              <a:defRPr/>
-            </a:pPr>
-            <a:r>
-              <a:rPr lang="zh-CN" altLang="en-US">
-                <a:solidFill>
-                  <a:srgbClr val="969FA7"/>
-                </a:solidFill>
-              </a:rPr>
-              <a:t>机器人学国家重点实验室</a:t>
-            </a:r>
-            <a:endParaRPr lang="zh-CN" altLang="en-US" dirty="0">
-              <a:solidFill>
-                <a:srgbClr val="969FA7"/>
-              </a:solidFill>
-            </a:endParaRPr>
+          <a:lstStyle>
+            <a:lvl1pPr>
+              <a:defRPr>
+                <a:solidFill>
+                  <a:schemeClr val="accent6"/>
+                </a:solidFill>
+              </a:defRPr>
+            </a:lvl1pPr>
+          </a:lstStyle>
+          <a:p>
+            <a:r>
+              <a:rPr lang="zh-CN" altLang="en-US" dirty="0"/>
+              <a:t>机器人与智能系统全国重点实验室</a:t>
+            </a:r>
+            <a:endParaRPr lang="en-US" altLang="zh-CN" dirty="0"/>
           </a:p>
         </p:txBody>
       </p:sp>
@@ -2591,7 +2563,7 @@
           <a:p>
             <a:fld id="{5E46059A-076A-4B8B-80B1-717B0ED88A00}" type="datetime1">
               <a:rPr lang="zh-CN" altLang="en-US" smtClean="0"/>
-              <a:t>2025/2/17</a:t>
+              <a:t>2025/9/3</a:t>
             </a:fld>
             <a:endParaRPr lang="zh-CN" altLang="en-US" dirty="0"/>
           </a:p>
@@ -2616,24 +2588,21 @@
         <p:spPr/>
         <p:txBody>
           <a:bodyPr/>
-          <a:lstStyle/>
-          <a:p>
-            <a:pPr>
-              <a:defRPr/>
-            </a:pPr>
-            <a:r>
-              <a:rPr lang="zh-CN" altLang="en-US">
-                <a:solidFill>
-                  <a:srgbClr val="969FA7"/>
-                </a:solidFill>
-              </a:rPr>
-              <a:t>机器人学国家重点实验室</a:t>
-            </a:r>
-            <a:endParaRPr lang="zh-CN" altLang="en-US" dirty="0">
-              <a:solidFill>
-                <a:srgbClr val="969FA7"/>
-              </a:solidFill>
-            </a:endParaRPr>
+          <a:lstStyle>
+            <a:lvl1pPr>
+              <a:defRPr>
+                <a:solidFill>
+                  <a:schemeClr val="accent6"/>
+                </a:solidFill>
+              </a:defRPr>
+            </a:lvl1pPr>
+          </a:lstStyle>
+          <a:p>
+            <a:r>
+              <a:rPr lang="zh-CN" altLang="en-US" dirty="0"/>
+              <a:t>机器人与智能系统全国重点实验室</a:t>
+            </a:r>
+            <a:endParaRPr lang="en-US" altLang="zh-CN" dirty="0"/>
           </a:p>
         </p:txBody>
       </p:sp>
@@ -2996,7 +2965,7 @@
           <a:p>
             <a:fld id="{1CEA2A28-72A1-41AC-9819-6926CDC6BF67}" type="datetime1">
               <a:rPr lang="zh-CN" altLang="en-US" smtClean="0"/>
-              <a:t>2025/2/17</a:t>
+              <a:t>2025/9/3</a:t>
             </a:fld>
             <a:endParaRPr lang="zh-CN" altLang="en-US" dirty="0"/>
           </a:p>
@@ -3033,30 +3002,17 @@
             <a:lvl1pPr algn="r">
               <a:defRPr sz="1200" b="1">
                 <a:solidFill>
-                  <a:schemeClr val="tx1">
-                    <a:tint val="82000"/>
-                  </a:schemeClr>
+                  <a:schemeClr val="accent6"/>
                 </a:solidFill>
               </a:defRPr>
             </a:lvl1pPr>
           </a:lstStyle>
           <a:p>
-            <a:pPr>
-              <a:defRPr/>
-            </a:pPr>
-            <a:r>
-              <a:rPr lang="zh-CN" altLang="en-US">
-                <a:solidFill>
-                  <a:srgbClr val="969FA7"/>
-                </a:solidFill>
-              </a:rPr>
-              <a:t>机器人学国家重点实验室</a:t>
-            </a:r>
-            <a:endParaRPr lang="zh-CN" altLang="en-US" dirty="0">
-              <a:solidFill>
-                <a:srgbClr val="969FA7"/>
-              </a:solidFill>
-            </a:endParaRPr>
+            <a:r>
+              <a:rPr lang="zh-CN" altLang="en-US" dirty="0"/>
+              <a:t>机器人与智能系统全国重点实验室</a:t>
+            </a:r>
+            <a:endParaRPr lang="en-US" altLang="zh-CN" dirty="0"/>
           </a:p>
         </p:txBody>
       </p:sp>
@@ -3345,7 +3301,7 @@
           <a:p>
             <a:fld id="{3B06ACBA-5A05-481D-964D-FB19C93FCB86}" type="datetime1">
               <a:rPr lang="zh-CN" altLang="en-US" smtClean="0"/>
-              <a:t>2025/2/17</a:t>
+              <a:t>2025/9/3</a:t>
             </a:fld>
             <a:endParaRPr lang="zh-CN" altLang="en-US" dirty="0"/>
           </a:p>
@@ -3370,24 +3326,21 @@
         <p:spPr/>
         <p:txBody>
           <a:bodyPr/>
-          <a:lstStyle/>
-          <a:p>
-            <a:pPr>
-              <a:defRPr/>
-            </a:pPr>
-            <a:r>
-              <a:rPr lang="zh-CN" altLang="en-US">
-                <a:solidFill>
-                  <a:srgbClr val="969FA7"/>
-                </a:solidFill>
-              </a:rPr>
-              <a:t>机器人学国家重点实验室</a:t>
-            </a:r>
-            <a:endParaRPr lang="zh-CN" altLang="en-US" dirty="0">
-              <a:solidFill>
-                <a:srgbClr val="969FA7"/>
-              </a:solidFill>
-            </a:endParaRPr>
+          <a:lstStyle>
+            <a:lvl1pPr>
+              <a:defRPr>
+                <a:solidFill>
+                  <a:schemeClr val="accent6"/>
+                </a:solidFill>
+              </a:defRPr>
+            </a:lvl1pPr>
+          </a:lstStyle>
+          <a:p>
+            <a:r>
+              <a:rPr lang="zh-CN" altLang="en-US" dirty="0"/>
+              <a:t>机器人与智能系统全国重点实验室</a:t>
+            </a:r>
+            <a:endParaRPr lang="en-US" altLang="zh-CN" dirty="0"/>
           </a:p>
         </p:txBody>
       </p:sp>
@@ -3689,7 +3642,7 @@
           <a:p>
             <a:fld id="{D158F434-7F73-4EC0-A21F-E9CB09655F4F}" type="datetime1">
               <a:rPr lang="zh-CN" altLang="en-US" smtClean="0"/>
-              <a:t>2025/2/17</a:t>
+              <a:t>2025/9/3</a:t>
             </a:fld>
             <a:endParaRPr lang="zh-CN" altLang="en-US" dirty="0"/>
           </a:p>
@@ -3714,24 +3667,21 @@
         <p:spPr/>
         <p:txBody>
           <a:bodyPr/>
-          <a:lstStyle/>
-          <a:p>
-            <a:pPr>
-              <a:defRPr/>
-            </a:pPr>
-            <a:r>
-              <a:rPr lang="zh-CN" altLang="en-US">
-                <a:solidFill>
-                  <a:srgbClr val="969FA7"/>
-                </a:solidFill>
-              </a:rPr>
-              <a:t>机器人学国家重点实验室</a:t>
-            </a:r>
-            <a:endParaRPr lang="zh-CN" altLang="en-US" dirty="0">
-              <a:solidFill>
-                <a:srgbClr val="969FA7"/>
-              </a:solidFill>
-            </a:endParaRPr>
+          <a:lstStyle>
+            <a:lvl1pPr>
+              <a:defRPr>
+                <a:solidFill>
+                  <a:schemeClr val="accent6"/>
+                </a:solidFill>
+              </a:defRPr>
+            </a:lvl1pPr>
+          </a:lstStyle>
+          <a:p>
+            <a:r>
+              <a:rPr lang="zh-CN" altLang="en-US" dirty="0"/>
+              <a:t>机器人与智能系统全国重点实验室</a:t>
+            </a:r>
+            <a:endParaRPr lang="en-US" altLang="zh-CN" dirty="0"/>
           </a:p>
         </p:txBody>
       </p:sp>
@@ -3983,7 +3933,7 @@
           <a:p>
             <a:fld id="{CA285437-A768-48A3-A559-20FCBC8EC51D}" type="datetime1">
               <a:rPr lang="zh-CN" altLang="en-US" smtClean="0"/>
-              <a:t>2025/2/17</a:t>
+              <a:t>2025/9/3</a:t>
             </a:fld>
             <a:endParaRPr lang="zh-CN" altLang="en-US" dirty="0"/>
           </a:p>
@@ -4008,24 +3958,21 @@
         <p:spPr/>
         <p:txBody>
           <a:bodyPr/>
-          <a:lstStyle/>
-          <a:p>
-            <a:pPr>
-              <a:defRPr/>
-            </a:pPr>
-            <a:r>
-              <a:rPr lang="zh-CN" altLang="en-US">
-                <a:solidFill>
-                  <a:srgbClr val="969FA7"/>
-                </a:solidFill>
-              </a:rPr>
-              <a:t>机器人学国家重点实验室</a:t>
-            </a:r>
-            <a:endParaRPr lang="zh-CN" altLang="en-US" dirty="0">
-              <a:solidFill>
-                <a:srgbClr val="969FA7"/>
-              </a:solidFill>
-            </a:endParaRPr>
+          <a:lstStyle>
+            <a:lvl1pPr>
+              <a:defRPr>
+                <a:solidFill>
+                  <a:schemeClr val="accent6"/>
+                </a:solidFill>
+              </a:defRPr>
+            </a:lvl1pPr>
+          </a:lstStyle>
+          <a:p>
+            <a:r>
+              <a:rPr lang="zh-CN" altLang="en-US" dirty="0"/>
+              <a:t>机器人与智能系统全国重点实验室</a:t>
+            </a:r>
+            <a:endParaRPr lang="en-US" altLang="zh-CN" dirty="0"/>
           </a:p>
         </p:txBody>
       </p:sp>
@@ -4288,7 +4235,7 @@
           <a:p>
             <a:fld id="{A18EADAC-8ADE-40B8-8937-83449D8D6B22}" type="datetime1">
               <a:rPr lang="zh-CN" altLang="en-US" smtClean="0"/>
-              <a:t>2025/2/17</a:t>
+              <a:t>2025/9/3</a:t>
             </a:fld>
             <a:endParaRPr lang="zh-CN" altLang="en-US" dirty="0"/>
           </a:p>
@@ -4313,24 +4260,21 @@
         <p:spPr/>
         <p:txBody>
           <a:bodyPr/>
-          <a:lstStyle/>
-          <a:p>
-            <a:pPr>
-              <a:defRPr/>
-            </a:pPr>
-            <a:r>
-              <a:rPr lang="zh-CN" altLang="en-US">
-                <a:solidFill>
-                  <a:srgbClr val="969FA7"/>
-                </a:solidFill>
-              </a:rPr>
-              <a:t>机器人学国家重点实验室</a:t>
-            </a:r>
-            <a:endParaRPr lang="zh-CN" altLang="en-US" dirty="0">
-              <a:solidFill>
-                <a:srgbClr val="969FA7"/>
-              </a:solidFill>
-            </a:endParaRPr>
+          <a:lstStyle>
+            <a:lvl1pPr>
+              <a:defRPr>
+                <a:solidFill>
+                  <a:schemeClr val="accent6"/>
+                </a:solidFill>
+              </a:defRPr>
+            </a:lvl1pPr>
+          </a:lstStyle>
+          <a:p>
+            <a:r>
+              <a:rPr lang="zh-CN" altLang="en-US" dirty="0"/>
+              <a:t>机器人与智能系统全国重点实验室</a:t>
+            </a:r>
+            <a:endParaRPr lang="en-US" altLang="zh-CN" dirty="0"/>
           </a:p>
         </p:txBody>
       </p:sp>
@@ -4729,7 +4673,7 @@
           <a:p>
             <a:fld id="{6F39C3FD-6156-413D-BCE2-517952DED593}" type="datetime1">
               <a:rPr lang="zh-CN" altLang="en-US" smtClean="0"/>
-              <a:t>2025/2/17</a:t>
+              <a:t>2025/9/3</a:t>
             </a:fld>
             <a:endParaRPr lang="zh-CN" altLang="en-US" dirty="0"/>
           </a:p>
@@ -4754,24 +4698,21 @@
         <p:spPr/>
         <p:txBody>
           <a:bodyPr/>
-          <a:lstStyle/>
-          <a:p>
-            <a:pPr>
-              <a:defRPr/>
-            </a:pPr>
-            <a:r>
-              <a:rPr lang="zh-CN" altLang="en-US">
-                <a:solidFill>
-                  <a:srgbClr val="969FA7"/>
-                </a:solidFill>
-              </a:rPr>
-              <a:t>机器人学国家重点实验室</a:t>
-            </a:r>
-            <a:endParaRPr lang="zh-CN" altLang="en-US" dirty="0">
-              <a:solidFill>
-                <a:srgbClr val="969FA7"/>
-              </a:solidFill>
-            </a:endParaRPr>
+          <a:lstStyle>
+            <a:lvl1pPr>
+              <a:defRPr>
+                <a:solidFill>
+                  <a:schemeClr val="accent6"/>
+                </a:solidFill>
+              </a:defRPr>
+            </a:lvl1pPr>
+          </a:lstStyle>
+          <a:p>
+            <a:r>
+              <a:rPr lang="zh-CN" altLang="en-US" dirty="0"/>
+              <a:t>机器人与智能系统全国重点实验室</a:t>
+            </a:r>
+            <a:endParaRPr lang="en-US" altLang="zh-CN" dirty="0"/>
           </a:p>
         </p:txBody>
       </p:sp>
@@ -4914,7 +4855,7 @@
           <a:p>
             <a:fld id="{8D866112-5836-4E11-92E8-DD549031DB08}" type="datetime1">
               <a:rPr lang="zh-CN" altLang="en-US" smtClean="0"/>
-              <a:t>2025/2/17</a:t>
+              <a:t>2025/9/3</a:t>
             </a:fld>
             <a:endParaRPr lang="zh-CN" altLang="en-US" dirty="0"/>
           </a:p>
@@ -4939,24 +4880,21 @@
         <p:spPr/>
         <p:txBody>
           <a:bodyPr/>
-          <a:lstStyle/>
-          <a:p>
-            <a:pPr>
-              <a:defRPr/>
-            </a:pPr>
-            <a:r>
-              <a:rPr lang="zh-CN" altLang="en-US">
-                <a:solidFill>
-                  <a:srgbClr val="969FA7"/>
-                </a:solidFill>
-              </a:rPr>
-              <a:t>机器人学国家重点实验室</a:t>
-            </a:r>
-            <a:endParaRPr lang="zh-CN" altLang="en-US" dirty="0">
-              <a:solidFill>
-                <a:srgbClr val="969FA7"/>
-              </a:solidFill>
-            </a:endParaRPr>
+          <a:lstStyle>
+            <a:lvl1pPr>
+              <a:defRPr>
+                <a:solidFill>
+                  <a:schemeClr val="accent6"/>
+                </a:solidFill>
+              </a:defRPr>
+            </a:lvl1pPr>
+          </a:lstStyle>
+          <a:p>
+            <a:r>
+              <a:rPr lang="zh-CN" altLang="en-US" dirty="0"/>
+              <a:t>机器人与智能系统全国重点实验室</a:t>
+            </a:r>
+            <a:endParaRPr lang="en-US" altLang="zh-CN" dirty="0"/>
           </a:p>
         </p:txBody>
       </p:sp>
@@ -5076,7 +5014,7 @@
           <a:p>
             <a:fld id="{881814E8-90EE-4B40-9F54-00C19D8A53BD}" type="datetime1">
               <a:rPr lang="zh-CN" altLang="en-US" smtClean="0"/>
-              <a:t>2025/2/17</a:t>
+              <a:t>2025/9/3</a:t>
             </a:fld>
             <a:endParaRPr lang="zh-CN" altLang="en-US" dirty="0"/>
           </a:p>
@@ -5101,24 +5039,21 @@
         <p:spPr/>
         <p:txBody>
           <a:bodyPr/>
-          <a:lstStyle/>
-          <a:p>
-            <a:pPr>
-              <a:defRPr/>
-            </a:pPr>
-            <a:r>
-              <a:rPr lang="zh-CN" altLang="en-US">
-                <a:solidFill>
-                  <a:srgbClr val="969FA7"/>
-                </a:solidFill>
-              </a:rPr>
-              <a:t>机器人学国家重点实验室</a:t>
-            </a:r>
-            <a:endParaRPr lang="zh-CN" altLang="en-US" dirty="0">
-              <a:solidFill>
-                <a:srgbClr val="969FA7"/>
-              </a:solidFill>
-            </a:endParaRPr>
+          <a:lstStyle>
+            <a:lvl1pPr>
+              <a:defRPr>
+                <a:solidFill>
+                  <a:schemeClr val="accent6"/>
+                </a:solidFill>
+              </a:defRPr>
+            </a:lvl1pPr>
+          </a:lstStyle>
+          <a:p>
+            <a:r>
+              <a:rPr lang="zh-CN" altLang="en-US" dirty="0"/>
+              <a:t>机器人与智能系统全国重点实验室</a:t>
+            </a:r>
+            <a:endParaRPr lang="en-US" altLang="zh-CN" dirty="0"/>
           </a:p>
         </p:txBody>
       </p:sp>
@@ -5486,7 +5421,7 @@
           <a:p>
             <a:fld id="{B6708EE8-E03F-4090-88A9-44058C63D22E}" type="datetime1">
               <a:rPr lang="zh-CN" altLang="en-US" smtClean="0"/>
-              <a:t>2025/2/17</a:t>
+              <a:t>2025/9/3</a:t>
             </a:fld>
             <a:endParaRPr lang="zh-CN" altLang="en-US" dirty="0"/>
           </a:p>
@@ -6295,7 +6230,7 @@
           <a:p>
             <a:fld id="{528373A4-58A8-4C76-8BD5-3F1EA18EA4AB}" type="datetime1">
               <a:rPr lang="zh-CN" altLang="en-US" smtClean="0"/>
-              <a:t>2025/2/17</a:t>
+              <a:t>2025/9/3</a:t>
             </a:fld>
             <a:endParaRPr lang="zh-CN" altLang="en-US" dirty="0"/>
           </a:p>
@@ -6327,22 +6262,11 @@
           <a:bodyPr/>
           <a:lstStyle/>
           <a:p>
-            <a:pPr>
-              <a:defRPr/>
-            </a:pPr>
-            <a:r>
-              <a:rPr lang="zh-CN" altLang="en-US">
-                <a:solidFill>
-                  <a:srgbClr val="969FA7"/>
-                </a:solidFill>
-              </a:rPr>
-              <a:t>机器人学国家重点实验室</a:t>
-            </a:r>
-            <a:endParaRPr lang="zh-CN" altLang="en-US" dirty="0">
-              <a:solidFill>
-                <a:srgbClr val="969FA7"/>
-              </a:solidFill>
-            </a:endParaRPr>
+            <a:r>
+              <a:rPr lang="zh-CN" altLang="en-US" dirty="0"/>
+              <a:t>机器人与智能系统全国重点实验室</a:t>
+            </a:r>
+            <a:endParaRPr lang="en-US" altLang="zh-CN" dirty="0"/>
           </a:p>
         </p:txBody>
       </p:sp>
@@ -8644,7 +8568,7 @@
           <a:p>
             <a:fld id="{9D459A85-202A-4208-BF7E-80DD9E5F3003}" type="datetime1">
               <a:rPr lang="zh-CN" altLang="en-US" smtClean="0"/>
-              <a:t>2025/2/17</a:t>
+              <a:t>2025/9/3</a:t>
             </a:fld>
             <a:endParaRPr lang="zh-CN" altLang="en-US" dirty="0"/>
           </a:p>
@@ -8676,22 +8600,11 @@
           <a:bodyPr/>
           <a:lstStyle/>
           <a:p>
-            <a:pPr>
-              <a:defRPr/>
-            </a:pPr>
-            <a:r>
-              <a:rPr lang="zh-CN" altLang="en-US">
-                <a:solidFill>
-                  <a:srgbClr val="969FA7"/>
-                </a:solidFill>
-              </a:rPr>
-              <a:t>机器人学国家重点实验室</a:t>
-            </a:r>
-            <a:endParaRPr lang="zh-CN" altLang="en-US" dirty="0">
-              <a:solidFill>
-                <a:srgbClr val="969FA7"/>
-              </a:solidFill>
-            </a:endParaRPr>
+            <a:r>
+              <a:rPr lang="zh-CN" altLang="en-US" dirty="0"/>
+              <a:t>机器人与智能系统全国重点实验室</a:t>
+            </a:r>
+            <a:endParaRPr lang="en-US" altLang="zh-CN" dirty="0"/>
           </a:p>
         </p:txBody>
       </p:sp>
@@ -11352,7 +11265,7 @@
           <a:p>
             <a:fld id="{FC1F935D-1FAF-4135-8D36-41EA0657F477}" type="datetime1">
               <a:rPr lang="zh-CN" altLang="en-US" smtClean="0"/>
-              <a:t>2025/2/17</a:t>
+              <a:t>2025/9/3</a:t>
             </a:fld>
             <a:endParaRPr lang="zh-CN" altLang="en-US" dirty="0"/>
           </a:p>
@@ -11384,22 +11297,11 @@
           <a:bodyPr/>
           <a:lstStyle/>
           <a:p>
-            <a:pPr>
-              <a:defRPr/>
-            </a:pPr>
-            <a:r>
-              <a:rPr lang="zh-CN" altLang="en-US">
-                <a:solidFill>
-                  <a:srgbClr val="969FA7"/>
-                </a:solidFill>
-              </a:rPr>
-              <a:t>机器人学国家重点实验室</a:t>
-            </a:r>
-            <a:endParaRPr lang="zh-CN" altLang="en-US" dirty="0">
-              <a:solidFill>
-                <a:srgbClr val="969FA7"/>
-              </a:solidFill>
-            </a:endParaRPr>
+            <a:r>
+              <a:rPr lang="zh-CN" altLang="en-US" dirty="0"/>
+              <a:t>机器人与智能系统全国重点实验室</a:t>
+            </a:r>
+            <a:endParaRPr lang="en-US" altLang="zh-CN" dirty="0"/>
           </a:p>
         </p:txBody>
       </p:sp>
@@ -11496,7 +11398,7 @@
           <a:p>
             <a:fld id="{29154D80-5079-494F-8034-545B6D374C5A}" type="datetime1">
               <a:rPr lang="zh-CN" altLang="en-US" smtClean="0"/>
-              <a:t>2025/2/17</a:t>
+              <a:t>2025/9/3</a:t>
             </a:fld>
             <a:endParaRPr lang="zh-CN" altLang="en-US" dirty="0"/>
           </a:p>
@@ -11528,22 +11430,11 @@
           <a:bodyPr/>
           <a:lstStyle/>
           <a:p>
-            <a:pPr>
-              <a:defRPr/>
-            </a:pPr>
-            <a:r>
-              <a:rPr lang="zh-CN" altLang="en-US">
-                <a:solidFill>
-                  <a:srgbClr val="969FA7"/>
-                </a:solidFill>
-              </a:rPr>
-              <a:t>机器人学国家重点实验室</a:t>
-            </a:r>
-            <a:endParaRPr lang="zh-CN" altLang="en-US" dirty="0">
-              <a:solidFill>
-                <a:srgbClr val="969FA7"/>
-              </a:solidFill>
-            </a:endParaRPr>
+            <a:r>
+              <a:rPr lang="zh-CN" altLang="en-US" dirty="0"/>
+              <a:t>机器人与智能系统全国重点实验室</a:t>
+            </a:r>
+            <a:endParaRPr lang="en-US" altLang="zh-CN" dirty="0"/>
           </a:p>
         </p:txBody>
       </p:sp>
@@ -13928,7 +13819,7 @@
           <a:p>
             <a:fld id="{27FD186D-352A-469C-8566-7947AF3BD077}" type="datetime1">
               <a:rPr lang="zh-CN" altLang="en-US" smtClean="0"/>
-              <a:t>2025/2/17</a:t>
+              <a:t>2025/9/3</a:t>
             </a:fld>
             <a:endParaRPr lang="zh-CN" altLang="en-US" dirty="0"/>
           </a:p>
@@ -13960,22 +13851,11 @@
           <a:bodyPr/>
           <a:lstStyle/>
           <a:p>
-            <a:pPr>
-              <a:defRPr/>
-            </a:pPr>
-            <a:r>
-              <a:rPr lang="zh-CN" altLang="en-US">
-                <a:solidFill>
-                  <a:srgbClr val="969FA7"/>
-                </a:solidFill>
-              </a:rPr>
-              <a:t>机器人学国家重点实验室</a:t>
-            </a:r>
-            <a:endParaRPr lang="zh-CN" altLang="en-US" dirty="0">
-              <a:solidFill>
-                <a:srgbClr val="969FA7"/>
-              </a:solidFill>
-            </a:endParaRPr>
+            <a:r>
+              <a:rPr lang="zh-CN" altLang="en-US" dirty="0"/>
+              <a:t>机器人与智能系统全国重点实验室</a:t>
+            </a:r>
+            <a:endParaRPr lang="en-US" altLang="zh-CN" dirty="0"/>
           </a:p>
         </p:txBody>
       </p:sp>
@@ -14072,7 +13952,7 @@
           <a:p>
             <a:fld id="{166C0D5A-EACF-485E-A3C6-054A2E29A4C4}" type="datetime1">
               <a:rPr lang="zh-CN" altLang="en-US" smtClean="0"/>
-              <a:t>2025/2/17</a:t>
+              <a:t>2025/9/3</a:t>
             </a:fld>
             <a:endParaRPr lang="zh-CN" altLang="en-US" dirty="0"/>
           </a:p>
@@ -14104,22 +13984,11 @@
           <a:bodyPr/>
           <a:lstStyle/>
           <a:p>
-            <a:pPr>
-              <a:defRPr/>
-            </a:pPr>
-            <a:r>
-              <a:rPr lang="zh-CN" altLang="en-US">
-                <a:solidFill>
-                  <a:srgbClr val="969FA7"/>
-                </a:solidFill>
-              </a:rPr>
-              <a:t>机器人学国家重点实验室</a:t>
-            </a:r>
-            <a:endParaRPr lang="zh-CN" altLang="en-US" dirty="0">
-              <a:solidFill>
-                <a:srgbClr val="969FA7"/>
-              </a:solidFill>
-            </a:endParaRPr>
+            <a:r>
+              <a:rPr lang="zh-CN" altLang="en-US" dirty="0"/>
+              <a:t>机器人与智能系统全国重点实验室</a:t>
+            </a:r>
+            <a:endParaRPr lang="en-US" altLang="zh-CN" dirty="0"/>
           </a:p>
         </p:txBody>
       </p:sp>
@@ -15663,7 +15532,7 @@
           <a:p>
             <a:fld id="{44E74EE9-59F7-4246-B8D9-8678ECE44BEF}" type="datetime1">
               <a:rPr lang="zh-CN" altLang="en-US" smtClean="0"/>
-              <a:t>2025/2/17</a:t>
+              <a:t>2025/9/3</a:t>
             </a:fld>
             <a:endParaRPr lang="zh-CN" altLang="en-US" dirty="0"/>
           </a:p>
@@ -15695,22 +15564,11 @@
           <a:bodyPr/>
           <a:lstStyle/>
           <a:p>
-            <a:pPr>
-              <a:defRPr/>
-            </a:pPr>
-            <a:r>
-              <a:rPr lang="zh-CN" altLang="en-US">
-                <a:solidFill>
-                  <a:srgbClr val="969FA7"/>
-                </a:solidFill>
-              </a:rPr>
-              <a:t>机器人学国家重点实验室</a:t>
-            </a:r>
-            <a:endParaRPr lang="zh-CN" altLang="en-US" dirty="0">
-              <a:solidFill>
-                <a:srgbClr val="969FA7"/>
-              </a:solidFill>
-            </a:endParaRPr>
+            <a:r>
+              <a:rPr lang="zh-CN" altLang="en-US" dirty="0"/>
+              <a:t>机器人与智能系统全国重点实验室</a:t>
+            </a:r>
+            <a:endParaRPr lang="en-US" altLang="zh-CN" dirty="0"/>
           </a:p>
         </p:txBody>
       </p:sp>
@@ -15884,7 +15742,7 @@
           <a:p>
             <a:fld id="{5F929DEA-D3D8-4977-992D-255D68B43E19}" type="datetime1">
               <a:rPr lang="zh-CN" altLang="en-US" smtClean="0"/>
-              <a:t>2025/2/17</a:t>
+              <a:t>2025/9/3</a:t>
             </a:fld>
             <a:endParaRPr lang="zh-CN" altLang="en-US" dirty="0"/>
           </a:p>
@@ -15974,22 +15832,11 @@
           <a:bodyPr/>
           <a:lstStyle/>
           <a:p>
-            <a:pPr>
-              <a:defRPr/>
-            </a:pPr>
-            <a:r>
-              <a:rPr lang="zh-CN" altLang="en-US">
-                <a:solidFill>
-                  <a:srgbClr val="969FA7"/>
-                </a:solidFill>
-              </a:rPr>
-              <a:t>机器人学国家重点实验室</a:t>
-            </a:r>
-            <a:endParaRPr lang="zh-CN" altLang="en-US" dirty="0">
-              <a:solidFill>
-                <a:srgbClr val="969FA7"/>
-              </a:solidFill>
-            </a:endParaRPr>
+            <a:r>
+              <a:rPr lang="zh-CN" altLang="en-US" dirty="0"/>
+              <a:t>机器人与智能系统全国重点实验室</a:t>
+            </a:r>
+            <a:endParaRPr lang="en-US" altLang="zh-CN" dirty="0"/>
           </a:p>
         </p:txBody>
       </p:sp>
@@ -16107,7 +15954,7 @@
           <a:p>
             <a:fld id="{BCE96F4C-1E24-4CB8-B39B-8503574478EB}" type="datetime1">
               <a:rPr lang="zh-CN" altLang="en-US" smtClean="0"/>
-              <a:t>2025/2/17</a:t>
+              <a:t>2025/9/3</a:t>
             </a:fld>
             <a:endParaRPr lang="zh-CN" altLang="en-US" dirty="0"/>
           </a:p>
@@ -16139,22 +15986,11 @@
           <a:bodyPr/>
           <a:lstStyle/>
           <a:p>
-            <a:pPr>
-              <a:defRPr/>
-            </a:pPr>
-            <a:r>
-              <a:rPr lang="zh-CN" altLang="en-US">
-                <a:solidFill>
-                  <a:srgbClr val="969FA7"/>
-                </a:solidFill>
-              </a:rPr>
-              <a:t>机器人学国家重点实验室</a:t>
-            </a:r>
-            <a:endParaRPr lang="zh-CN" altLang="en-US" dirty="0">
-              <a:solidFill>
-                <a:srgbClr val="969FA7"/>
-              </a:solidFill>
-            </a:endParaRPr>
+            <a:r>
+              <a:rPr lang="zh-CN" altLang="en-US" dirty="0"/>
+              <a:t>机器人与智能系统全国重点实验室</a:t>
+            </a:r>
+            <a:endParaRPr lang="en-US" altLang="zh-CN" dirty="0"/>
           </a:p>
         </p:txBody>
       </p:sp>
@@ -16519,7 +16355,7 @@
           <a:p>
             <a:fld id="{2B469E27-651B-4BF2-943C-A06912F1416C}" type="datetime1">
               <a:rPr lang="zh-CN" altLang="en-US" smtClean="0"/>
-              <a:t>2025/2/17</a:t>
+              <a:t>2025/9/3</a:t>
             </a:fld>
             <a:endParaRPr lang="zh-CN" altLang="en-US" dirty="0"/>
           </a:p>
@@ -16551,22 +16387,11 @@
           <a:bodyPr/>
           <a:lstStyle/>
           <a:p>
-            <a:pPr>
-              <a:defRPr/>
-            </a:pPr>
-            <a:r>
-              <a:rPr lang="zh-CN" altLang="en-US">
-                <a:solidFill>
-                  <a:srgbClr val="969FA7"/>
-                </a:solidFill>
-              </a:rPr>
-              <a:t>机器人学国家重点实验室</a:t>
-            </a:r>
-            <a:endParaRPr lang="zh-CN" altLang="en-US" dirty="0">
-              <a:solidFill>
-                <a:srgbClr val="969FA7"/>
-              </a:solidFill>
-            </a:endParaRPr>
+            <a:r>
+              <a:rPr lang="zh-CN" altLang="en-US" dirty="0"/>
+              <a:t>机器人与智能系统全国重点实验室</a:t>
+            </a:r>
+            <a:endParaRPr lang="en-US" altLang="zh-CN" dirty="0"/>
           </a:p>
         </p:txBody>
       </p:sp>
@@ -16752,7 +16577,7 @@
           <a:p>
             <a:fld id="{9E08EC0C-4C0D-4EE2-8801-6BCCC5E37A54}" type="datetime1">
               <a:rPr lang="zh-CN" altLang="en-US" smtClean="0"/>
-              <a:t>2025/2/17</a:t>
+              <a:t>2025/9/3</a:t>
             </a:fld>
             <a:endParaRPr lang="zh-CN" altLang="en-US" dirty="0"/>
           </a:p>
@@ -16784,22 +16609,11 @@
           <a:bodyPr/>
           <a:lstStyle/>
           <a:p>
-            <a:pPr>
-              <a:defRPr/>
-            </a:pPr>
-            <a:r>
-              <a:rPr lang="zh-CN" altLang="en-US">
-                <a:solidFill>
-                  <a:srgbClr val="969FA7"/>
-                </a:solidFill>
-              </a:rPr>
-              <a:t>机器人学国家重点实验室</a:t>
-            </a:r>
-            <a:endParaRPr lang="zh-CN" altLang="en-US" dirty="0">
-              <a:solidFill>
-                <a:srgbClr val="969FA7"/>
-              </a:solidFill>
-            </a:endParaRPr>
+            <a:r>
+              <a:rPr lang="zh-CN" altLang="en-US" dirty="0"/>
+              <a:t>机器人与智能系统全国重点实验室</a:t>
+            </a:r>
+            <a:endParaRPr lang="en-US" altLang="zh-CN" dirty="0"/>
           </a:p>
         </p:txBody>
       </p:sp>
@@ -17067,7 +16881,7 @@
           <a:p>
             <a:fld id="{23DA9C19-1309-4B1D-A21D-A66533D4891B}" type="datetime1">
               <a:rPr lang="zh-CN" altLang="en-US" smtClean="0"/>
-              <a:t>2025/2/17</a:t>
+              <a:t>2025/9/3</a:t>
             </a:fld>
             <a:endParaRPr lang="zh-CN" altLang="en-US" dirty="0"/>
           </a:p>
@@ -17099,22 +16913,11 @@
           <a:bodyPr/>
           <a:lstStyle/>
           <a:p>
-            <a:pPr>
-              <a:defRPr/>
-            </a:pPr>
-            <a:r>
-              <a:rPr lang="zh-CN" altLang="en-US">
-                <a:solidFill>
-                  <a:srgbClr val="969FA7"/>
-                </a:solidFill>
-              </a:rPr>
-              <a:t>机器人学国家重点实验室</a:t>
-            </a:r>
-            <a:endParaRPr lang="zh-CN" altLang="en-US" dirty="0">
-              <a:solidFill>
-                <a:srgbClr val="969FA7"/>
-              </a:solidFill>
-            </a:endParaRPr>
+            <a:r>
+              <a:rPr lang="zh-CN" altLang="en-US" dirty="0"/>
+              <a:t>机器人与智能系统全国重点实验室</a:t>
+            </a:r>
+            <a:endParaRPr lang="en-US" altLang="zh-CN" dirty="0"/>
           </a:p>
         </p:txBody>
       </p:sp>
@@ -17354,7 +17157,7 @@
           <a:p>
             <a:fld id="{13AC6301-9C4A-4FF7-BDDE-5EE483DC2A27}" type="datetime1">
               <a:rPr lang="zh-CN" altLang="en-US" smtClean="0"/>
-              <a:t>2025/2/17</a:t>
+              <a:t>2025/9/3</a:t>
             </a:fld>
             <a:endParaRPr lang="zh-CN" altLang="en-US" dirty="0"/>
           </a:p>
@@ -17386,22 +17189,11 @@
           <a:bodyPr/>
           <a:lstStyle/>
           <a:p>
-            <a:pPr>
-              <a:defRPr/>
-            </a:pPr>
-            <a:r>
-              <a:rPr lang="zh-CN" altLang="en-US">
-                <a:solidFill>
-                  <a:srgbClr val="969FA7"/>
-                </a:solidFill>
-              </a:rPr>
-              <a:t>机器人学国家重点实验室</a:t>
-            </a:r>
-            <a:endParaRPr lang="zh-CN" altLang="en-US" dirty="0">
-              <a:solidFill>
-                <a:srgbClr val="969FA7"/>
-              </a:solidFill>
-            </a:endParaRPr>
+            <a:r>
+              <a:rPr lang="zh-CN" altLang="en-US" dirty="0"/>
+              <a:t>机器人与智能系统全国重点实验室</a:t>
+            </a:r>
+            <a:endParaRPr lang="en-US" altLang="zh-CN" dirty="0"/>
           </a:p>
         </p:txBody>
       </p:sp>
@@ -17498,7 +17290,7 @@
           <a:p>
             <a:fld id="{08D1ED80-F88D-4516-8307-032E14FBFBA9}" type="datetime1">
               <a:rPr lang="zh-CN" altLang="en-US" smtClean="0"/>
-              <a:t>2025/2/17</a:t>
+              <a:t>2025/9/3</a:t>
             </a:fld>
             <a:endParaRPr lang="zh-CN" altLang="en-US" dirty="0"/>
           </a:p>
@@ -17530,22 +17322,11 @@
           <a:bodyPr/>
           <a:lstStyle/>
           <a:p>
-            <a:pPr>
-              <a:defRPr/>
-            </a:pPr>
-            <a:r>
-              <a:rPr lang="zh-CN" altLang="en-US">
-                <a:solidFill>
-                  <a:srgbClr val="969FA7"/>
-                </a:solidFill>
-              </a:rPr>
-              <a:t>机器人学国家重点实验室</a:t>
-            </a:r>
-            <a:endParaRPr lang="zh-CN" altLang="en-US" dirty="0">
-              <a:solidFill>
-                <a:srgbClr val="969FA7"/>
-              </a:solidFill>
-            </a:endParaRPr>
+            <a:r>
+              <a:rPr lang="zh-CN" altLang="en-US" dirty="0"/>
+              <a:t>机器人与智能系统全国重点实验室</a:t>
+            </a:r>
+            <a:endParaRPr lang="en-US" altLang="zh-CN" dirty="0"/>
           </a:p>
         </p:txBody>
       </p:sp>
@@ -18021,7 +17802,7 @@
           <a:p>
             <a:fld id="{1C71D0DD-D925-4929-9DC6-DC87462109A2}" type="datetime1">
               <a:rPr lang="zh-CN" altLang="en-US" smtClean="0"/>
-              <a:t>2025/2/17</a:t>
+              <a:t>2025/9/3</a:t>
             </a:fld>
             <a:endParaRPr lang="zh-CN" altLang="en-US" dirty="0"/>
           </a:p>
@@ -18053,22 +17834,11 @@
           <a:bodyPr/>
           <a:lstStyle/>
           <a:p>
-            <a:pPr>
-              <a:defRPr/>
-            </a:pPr>
-            <a:r>
-              <a:rPr lang="zh-CN" altLang="en-US">
-                <a:solidFill>
-                  <a:srgbClr val="969FA7"/>
-                </a:solidFill>
-              </a:rPr>
-              <a:t>机器人学国家重点实验室</a:t>
-            </a:r>
-            <a:endParaRPr lang="zh-CN" altLang="en-US" dirty="0">
-              <a:solidFill>
-                <a:srgbClr val="969FA7"/>
-              </a:solidFill>
-            </a:endParaRPr>
+            <a:r>
+              <a:rPr lang="zh-CN" altLang="en-US" dirty="0"/>
+              <a:t>机器人与智能系统全国重点实验室</a:t>
+            </a:r>
+            <a:endParaRPr lang="en-US" altLang="zh-CN" dirty="0"/>
           </a:p>
         </p:txBody>
       </p:sp>

</xml_diff>